<commit_message>
revised based on class notes
</commit_message>
<xml_diff>
--- a/SEDS_content/07.Testing.pptx
+++ b/SEDS_content/07.Testing.pptx
@@ -4448,13 +4448,7 @@
               <a:rPr lang="en-US" dirty="0" smtClean="0">
                 <a:latin typeface="Calibri" charset="0"/>
               </a:rPr>
-              <a:t>&amp;</a:t>
-            </a:r>
-            <a:r>
-              <a:rPr lang="en-US" dirty="0" smtClean="0">
-                <a:latin typeface="Calibri" charset="0"/>
-              </a:rPr>
-              <a:t> asserts</a:t>
+              <a:t>&amp; asserts</a:t>
             </a:r>
           </a:p>
           <a:p>

</xml_diff>